<commit_message>
Update Titanic EMADE GP Team 5 .pptx
</commit_message>
<xml_diff>
--- a/results/Titanic EMADE GP Team 5 .pptx
+++ b/results/Titanic EMADE GP Team 5 .pptx
@@ -4730,6 +4730,43 @@
             </a:r>
           </a:p>
           <a:p>
+            <a:pPr lvl="1" indent="-228600" algn="l" fontAlgn="base">
+              <a:spcBef>
+                <a:spcPct val="0"/>
+              </a:spcBef>
+              <a:spcAft>
+                <a:spcPts val="600"/>
+              </a:spcAft>
+              <a:buFont typeface="Arial" panose="020B0604020202020204" pitchFamily="34" charset="0"/>
+              <a:buChar char="•"/>
+            </a:pPr>
+            <a:r>
+              <a:rPr kumimoji="0" lang="en-US" altLang="en-US" sz="1400" b="0" i="0" u="none" strike="noStrike" cap="none" normalizeH="0" baseline="0" dirty="0">
+                <a:ln>
+                  <a:noFill/>
+                </a:ln>
+                <a:effectLst/>
+              </a:rPr>
+              <a:t>Time take: 4 hours</a:t>
+            </a:r>
+          </a:p>
+          <a:p>
+            <a:pPr lvl="1" indent="-228600" algn="l" fontAlgn="base">
+              <a:spcBef>
+                <a:spcPct val="0"/>
+              </a:spcBef>
+              <a:spcAft>
+                <a:spcPts val="600"/>
+              </a:spcAft>
+              <a:buFont typeface="Arial" panose="020B0604020202020204" pitchFamily="34" charset="0"/>
+              <a:buChar char="•"/>
+            </a:pPr>
+            <a:r>
+              <a:rPr lang="en-US" altLang="en-US" sz="1400" dirty="0"/>
+              <a:t>Generation: 37</a:t>
+            </a:r>
+          </a:p>
+          <a:p>
             <a:pPr marL="0" marR="0" lvl="0" indent="-228600" algn="l" fontAlgn="base">
               <a:spcBef>
                 <a:spcPct val="0"/>
@@ -4745,54 +4782,7 @@
             </a:pPr>
             <a:r>
               <a:rPr lang="en-US" altLang="en-US" sz="1800" dirty="0"/>
-              <a:t>- </a:t>
-            </a:r>
-            <a:r>
-              <a:rPr kumimoji="0" lang="en-US" altLang="en-US" sz="1800" b="0" i="0" u="none" strike="noStrike" cap="none" normalizeH="0" baseline="0" dirty="0">
-                <a:ln>
-                  <a:noFill/>
-                </a:ln>
-                <a:effectLst/>
-              </a:rPr>
-              <a:t>Time take: 4 hours</a:t>
-            </a:r>
-          </a:p>
-          <a:p>
-            <a:pPr marL="0" marR="0" lvl="0" indent="-228600" algn="l" fontAlgn="base">
-              <a:spcBef>
-                <a:spcPct val="0"/>
-              </a:spcBef>
-              <a:spcAft>
-                <a:spcPts val="600"/>
-              </a:spcAft>
-              <a:buClrTx/>
-              <a:buSzTx/>
-              <a:buFont typeface="Arial" panose="020B0604020202020204" pitchFamily="34" charset="0"/>
-              <a:buChar char="•"/>
-              <a:tabLst/>
-            </a:pPr>
-            <a:r>
-              <a:rPr lang="en-US" altLang="en-US" sz="1800" dirty="0"/>
-              <a:t>- Generation: 37</a:t>
-            </a:r>
-          </a:p>
-          <a:p>
-            <a:pPr marL="0" marR="0" lvl="0" indent="-228600" algn="l" fontAlgn="base">
-              <a:spcBef>
-                <a:spcPct val="0"/>
-              </a:spcBef>
-              <a:spcAft>
-                <a:spcPts val="600"/>
-              </a:spcAft>
-              <a:buClrTx/>
-              <a:buSzTx/>
-              <a:buFont typeface="Arial" panose="020B0604020202020204" pitchFamily="34" charset="0"/>
-              <a:buChar char="•"/>
-              <a:tabLst/>
-            </a:pPr>
-            <a:r>
-              <a:rPr lang="en-US" altLang="en-US" sz="1800" dirty="0"/>
-              <a:t>HOF </a:t>
+              <a:t>Pareto Frontier </a:t>
             </a:r>
             <a:r>
               <a:rPr kumimoji="0" lang="en-US" altLang="en-US" sz="1800" b="0" i="0" u="none" strike="noStrike" cap="none" normalizeH="0" baseline="0" dirty="0">
@@ -4879,14 +4869,36 @@
               <a:buChar char="•"/>
             </a:pPr>
             <a:r>
-              <a:rPr kumimoji="0" lang="en-US" altLang="en-US" sz="1800" b="0" i="0" u="none" strike="noStrike" cap="none" normalizeH="0" baseline="0" dirty="0">
+              <a:rPr lang="en-US" altLang="en-US" sz="1800" dirty="0"/>
+              <a:t>Pareto </a:t>
+            </a:r>
+            <a:r>
+              <a:rPr lang="en-US" altLang="en-US" sz="1800"/>
+              <a:t>Frontier</a:t>
+            </a:r>
+            <a:r>
+              <a:rPr kumimoji="0" lang="en-US" altLang="en-US" sz="1800" b="0" i="0" u="none" strike="noStrike" cap="none" normalizeH="0" baseline="0">
                 <a:ln>
                   <a:noFill/>
                 </a:ln>
                 <a:effectLst/>
               </a:rPr>
-              <a:t>HOF #</a:t>
-            </a:r>
+              <a:t> </a:t>
+            </a:r>
+            <a:r>
+              <a:rPr lang="en-US" altLang="en-US" sz="1800"/>
+              <a:t>member </a:t>
+            </a:r>
+            <a:r>
+              <a:rPr lang="en-US" altLang="en-US" sz="1800" dirty="0"/>
+              <a:t>#</a:t>
+            </a:r>
+            <a:endParaRPr kumimoji="0" lang="en-US" altLang="en-US" sz="1800" b="0" i="0" u="none" strike="noStrike" cap="none" normalizeH="0" baseline="0" dirty="0">
+              <a:ln>
+                <a:noFill/>
+              </a:ln>
+              <a:effectLst/>
+            </a:endParaRPr>
           </a:p>
           <a:p>
             <a:pPr lvl="1" indent="-228600" algn="l" fontAlgn="base">

</xml_diff>